<commit_message>
use RMSE instead of R2
</commit_message>
<xml_diff>
--- a/ActiveLearning.pptx
+++ b/ActiveLearning.pptx
@@ -5,24 +5,25 @@
     <p:sldMasterId id="2147483648" r:id="rId1"/>
   </p:sldMasterIdLst>
   <p:notesMasterIdLst>
-    <p:notesMasterId r:id="rId17"/>
+    <p:notesMasterId r:id="rId18"/>
   </p:notesMasterIdLst>
   <p:sldIdLst>
     <p:sldId id="256" r:id="rId2"/>
     <p:sldId id="267" r:id="rId3"/>
     <p:sldId id="263" r:id="rId4"/>
-    <p:sldId id="270" r:id="rId5"/>
-    <p:sldId id="271" r:id="rId6"/>
-    <p:sldId id="269" r:id="rId7"/>
-    <p:sldId id="266" r:id="rId8"/>
-    <p:sldId id="268" r:id="rId9"/>
-    <p:sldId id="264" r:id="rId10"/>
-    <p:sldId id="257" r:id="rId11"/>
-    <p:sldId id="262" r:id="rId12"/>
-    <p:sldId id="260" r:id="rId13"/>
-    <p:sldId id="258" r:id="rId14"/>
-    <p:sldId id="259" r:id="rId15"/>
-    <p:sldId id="261" r:id="rId16"/>
+    <p:sldId id="271" r:id="rId5"/>
+    <p:sldId id="270" r:id="rId6"/>
+    <p:sldId id="272" r:id="rId7"/>
+    <p:sldId id="269" r:id="rId8"/>
+    <p:sldId id="266" r:id="rId9"/>
+    <p:sldId id="268" r:id="rId10"/>
+    <p:sldId id="264" r:id="rId11"/>
+    <p:sldId id="257" r:id="rId12"/>
+    <p:sldId id="262" r:id="rId13"/>
+    <p:sldId id="260" r:id="rId14"/>
+    <p:sldId id="258" r:id="rId15"/>
+    <p:sldId id="259" r:id="rId16"/>
+    <p:sldId id="261" r:id="rId17"/>
   </p:sldIdLst>
   <p:sldSz cx="12192000" cy="6858000"/>
   <p:notesSz cx="6858000" cy="9144000"/>
@@ -5197,6 +5198,71 @@
       </p:grpSpPr>
       <p:pic>
         <p:nvPicPr>
+          <p:cNvPr id="5" name="Content Placeholder 4" descr="Chart, line chart&#10;&#10;Description automatically generated">
+            <a:extLst>
+              <a:ext uri="{FF2B5EF4-FFF2-40B4-BE49-F238E27FC236}">
+                <a16:creationId xmlns:a16="http://schemas.microsoft.com/office/drawing/2014/main" id="{A6D80025-1B3F-0C30-D5FA-E6CE702D9571}"/>
+              </a:ext>
+            </a:extLst>
+          </p:cNvPr>
+          <p:cNvPicPr>
+            <a:picLocks noGrp="1" noChangeAspect="1"/>
+          </p:cNvPicPr>
+          <p:nvPr>
+            <p:ph idx="1"/>
+          </p:nvPr>
+        </p:nvPicPr>
+        <p:blipFill>
+          <a:blip r:embed="rId2">
+            <a:extLst>
+              <a:ext uri="{28A0092B-C50C-407E-A947-70E740481C1C}">
+                <a14:useLocalDpi xmlns:a14="http://schemas.microsoft.com/office/drawing/2010/main" val="0"/>
+              </a:ext>
+            </a:extLst>
+          </a:blip>
+          <a:stretch>
+            <a:fillRect/>
+          </a:stretch>
+        </p:blipFill>
+        <p:spPr>
+          <a:xfrm>
+            <a:off x="3195108" y="1253331"/>
+            <a:ext cx="5801784" cy="4351338"/>
+          </a:xfrm>
+        </p:spPr>
+      </p:pic>
+    </p:spTree>
+    <p:extLst>
+      <p:ext uri="{BB962C8B-B14F-4D97-AF65-F5344CB8AC3E}">
+        <p14:creationId xmlns:p14="http://schemas.microsoft.com/office/powerpoint/2010/main" val="3989693785"/>
+      </p:ext>
+    </p:extLst>
+  </p:cSld>
+  <p:clrMapOvr>
+    <a:masterClrMapping/>
+  </p:clrMapOvr>
+</p:sld>
+</file>
+
+<file path=ppt/slides/slide11.xml><?xml version="1.0" encoding="utf-8"?>
+<p:sld xmlns:a="http://schemas.openxmlformats.org/drawingml/2006/main" xmlns:r="http://schemas.openxmlformats.org/officeDocument/2006/relationships" xmlns:p="http://schemas.openxmlformats.org/presentationml/2006/main">
+  <p:cSld>
+    <p:spTree>
+      <p:nvGrpSpPr>
+        <p:cNvPr id="1" name=""/>
+        <p:cNvGrpSpPr/>
+        <p:nvPr/>
+      </p:nvGrpSpPr>
+      <p:grpSpPr>
+        <a:xfrm>
+          <a:off x="0" y="0"/>
+          <a:ext cx="0" cy="0"/>
+          <a:chOff x="0" y="0"/>
+          <a:chExt cx="0" cy="0"/>
+        </a:xfrm>
+      </p:grpSpPr>
+      <p:pic>
+        <p:nvPicPr>
           <p:cNvPr id="5" name="Content Placeholder 4" descr="Shape&#10;&#10;Description automatically generated with medium confidence">
             <a:extLst>
               <a:ext uri="{FF2B5EF4-FFF2-40B4-BE49-F238E27FC236}">
@@ -5531,7 +5597,7 @@
 </p:sld>
 </file>
 
-<file path=ppt/slides/slide11.xml><?xml version="1.0" encoding="utf-8"?>
+<file path=ppt/slides/slide12.xml><?xml version="1.0" encoding="utf-8"?>
 <p:sld xmlns:a="http://schemas.openxmlformats.org/drawingml/2006/main" xmlns:r="http://schemas.openxmlformats.org/officeDocument/2006/relationships" xmlns:p="http://schemas.openxmlformats.org/presentationml/2006/main">
   <p:cSld>
     <p:spTree>
@@ -5591,7 +5657,7 @@
 </p:sld>
 </file>
 
-<file path=ppt/slides/slide12.xml><?xml version="1.0" encoding="utf-8"?>
+<file path=ppt/slides/slide13.xml><?xml version="1.0" encoding="utf-8"?>
 <p:sld xmlns:a="http://schemas.openxmlformats.org/drawingml/2006/main" xmlns:r="http://schemas.openxmlformats.org/officeDocument/2006/relationships" xmlns:p="http://schemas.openxmlformats.org/presentationml/2006/main">
   <p:cSld>
     <p:spTree>
@@ -5671,7 +5737,7 @@
 </p:sld>
 </file>
 
-<file path=ppt/slides/slide13.xml><?xml version="1.0" encoding="utf-8"?>
+<file path=ppt/slides/slide14.xml><?xml version="1.0" encoding="utf-8"?>
 <p:sld xmlns:a="http://schemas.openxmlformats.org/drawingml/2006/main" xmlns:r="http://schemas.openxmlformats.org/officeDocument/2006/relationships" xmlns:p="http://schemas.openxmlformats.org/presentationml/2006/main">
   <p:cSld>
     <p:spTree>
@@ -5788,7 +5854,7 @@
 </p:sld>
 </file>
 
-<file path=ppt/slides/slide14.xml><?xml version="1.0" encoding="utf-8"?>
+<file path=ppt/slides/slide15.xml><?xml version="1.0" encoding="utf-8"?>
 <p:sld xmlns:a="http://schemas.openxmlformats.org/drawingml/2006/main" xmlns:r="http://schemas.openxmlformats.org/officeDocument/2006/relationships" xmlns:p="http://schemas.openxmlformats.org/presentationml/2006/main">
   <p:cSld>
     <p:spTree>
@@ -5874,7 +5940,7 @@
 </p:sld>
 </file>
 
-<file path=ppt/slides/slide15.xml><?xml version="1.0" encoding="utf-8"?>
+<file path=ppt/slides/slide16.xml><?xml version="1.0" encoding="utf-8"?>
 <p:sld xmlns:a="http://schemas.openxmlformats.org/drawingml/2006/main" xmlns:r="http://schemas.openxmlformats.org/officeDocument/2006/relationships" xmlns:p="http://schemas.openxmlformats.org/presentationml/2006/main">
   <p:cSld>
     <p:spTree>
@@ -6501,159 +6567,6 @@
           <p:cNvPr id="2" name="Title 1">
             <a:extLst>
               <a:ext uri="{FF2B5EF4-FFF2-40B4-BE49-F238E27FC236}">
-                <a16:creationId xmlns:a16="http://schemas.microsoft.com/office/drawing/2014/main" id="{EE523BD8-7A95-1AA5-5AE6-9432D1307AC3}"/>
-              </a:ext>
-            </a:extLst>
-          </p:cNvPr>
-          <p:cNvSpPr>
-            <a:spLocks noGrp="1"/>
-          </p:cNvSpPr>
-          <p:nvPr>
-            <p:ph type="title"/>
-          </p:nvPr>
-        </p:nvSpPr>
-        <p:spPr/>
-        <p:txBody>
-          <a:bodyPr/>
-          <a:lstStyle/>
-          <a:p>
-            <a:r>
-              <a:rPr lang="en-US" dirty="0"/>
-              <a:t>Data segregation</a:t>
-            </a:r>
-            <a:endParaRPr lang="en-GB" dirty="0"/>
-          </a:p>
-        </p:txBody>
-      </p:sp>
-      <p:sp>
-        <p:nvSpPr>
-          <p:cNvPr id="3" name="Content Placeholder 2">
-            <a:extLst>
-              <a:ext uri="{FF2B5EF4-FFF2-40B4-BE49-F238E27FC236}">
-                <a16:creationId xmlns:a16="http://schemas.microsoft.com/office/drawing/2014/main" id="{E8E002E2-5EE4-3063-81A4-8AA5072E1C79}"/>
-              </a:ext>
-            </a:extLst>
-          </p:cNvPr>
-          <p:cNvSpPr>
-            <a:spLocks noGrp="1"/>
-          </p:cNvSpPr>
-          <p:nvPr>
-            <p:ph idx="1"/>
-          </p:nvPr>
-        </p:nvSpPr>
-        <p:spPr/>
-        <p:txBody>
-          <a:bodyPr>
-            <a:normAutofit/>
-          </a:bodyPr>
-          <a:lstStyle/>
-          <a:p>
-            <a:endParaRPr lang="en-US" dirty="0"/>
-          </a:p>
-          <a:p>
-            <a:endParaRPr lang="en-US" dirty="0"/>
-          </a:p>
-          <a:p>
-            <a:r>
-              <a:rPr lang="en-US" dirty="0"/>
-              <a:t>Overfitting</a:t>
-            </a:r>
-          </a:p>
-          <a:p>
-            <a:endParaRPr lang="en-US" dirty="0"/>
-          </a:p>
-          <a:p>
-            <a:endParaRPr lang="en-US" dirty="0"/>
-          </a:p>
-          <a:p>
-            <a:endParaRPr lang="en-US" dirty="0"/>
-          </a:p>
-          <a:p>
-            <a:pPr marL="0" indent="0">
-              <a:buNone/>
-            </a:pPr>
-            <a:endParaRPr lang="en-US" dirty="0"/>
-          </a:p>
-          <a:p>
-            <a:r>
-              <a:rPr lang="en-US" dirty="0"/>
-              <a:t>Train, test and validate!</a:t>
-            </a:r>
-            <a:endParaRPr lang="en-GB" dirty="0"/>
-          </a:p>
-        </p:txBody>
-      </p:sp>
-      <p:pic>
-        <p:nvPicPr>
-          <p:cNvPr id="5" name="Picture 4" descr="Diagram&#10;&#10;Description automatically generated">
-            <a:extLst>
-              <a:ext uri="{FF2B5EF4-FFF2-40B4-BE49-F238E27FC236}">
-                <a16:creationId xmlns:a16="http://schemas.microsoft.com/office/drawing/2014/main" id="{1D61F28C-7B0E-727A-E794-9E093D161F49}"/>
-              </a:ext>
-            </a:extLst>
-          </p:cNvPr>
-          <p:cNvPicPr>
-            <a:picLocks noChangeAspect="1"/>
-          </p:cNvPicPr>
-          <p:nvPr/>
-        </p:nvPicPr>
-        <p:blipFill>
-          <a:blip r:embed="rId2">
-            <a:extLst>
-              <a:ext uri="{28A0092B-C50C-407E-A947-70E740481C1C}">
-                <a14:useLocalDpi xmlns:a14="http://schemas.microsoft.com/office/drawing/2010/main" val="0"/>
-              </a:ext>
-            </a:extLst>
-          </a:blip>
-          <a:stretch>
-            <a:fillRect/>
-          </a:stretch>
-        </p:blipFill>
-        <p:spPr>
-          <a:xfrm>
-            <a:off x="3962400" y="1476556"/>
-            <a:ext cx="7871791" cy="3428165"/>
-          </a:xfrm>
-          <a:prstGeom prst="rect">
-            <a:avLst/>
-          </a:prstGeom>
-        </p:spPr>
-      </p:pic>
-    </p:spTree>
-    <p:extLst>
-      <p:ext uri="{BB962C8B-B14F-4D97-AF65-F5344CB8AC3E}">
-        <p14:creationId xmlns:p14="http://schemas.microsoft.com/office/powerpoint/2010/main" val="2219305440"/>
-      </p:ext>
-    </p:extLst>
-  </p:cSld>
-  <p:clrMapOvr>
-    <a:masterClrMapping/>
-  </p:clrMapOvr>
-</p:sld>
-</file>
-
-<file path=ppt/slides/slide5.xml><?xml version="1.0" encoding="utf-8"?>
-<p:sld xmlns:a="http://schemas.openxmlformats.org/drawingml/2006/main" xmlns:r="http://schemas.openxmlformats.org/officeDocument/2006/relationships" xmlns:p="http://schemas.openxmlformats.org/presentationml/2006/main">
-  <p:cSld>
-    <p:spTree>
-      <p:nvGrpSpPr>
-        <p:cNvPr id="1" name=""/>
-        <p:cNvGrpSpPr/>
-        <p:nvPr/>
-      </p:nvGrpSpPr>
-      <p:grpSpPr>
-        <a:xfrm>
-          <a:off x="0" y="0"/>
-          <a:ext cx="0" cy="0"/>
-          <a:chOff x="0" y="0"/>
-          <a:chExt cx="0" cy="0"/>
-        </a:xfrm>
-      </p:grpSpPr>
-      <p:sp>
-        <p:nvSpPr>
-          <p:cNvPr id="2" name="Title 1">
-            <a:extLst>
-              <a:ext uri="{FF2B5EF4-FFF2-40B4-BE49-F238E27FC236}">
                 <a16:creationId xmlns:a16="http://schemas.microsoft.com/office/drawing/2014/main" id="{09D6C8FC-2987-FF27-54AF-6A67A4AFD78F}"/>
               </a:ext>
             </a:extLst>
@@ -6939,6 +6852,159 @@
 </p:sld>
 </file>
 
+<file path=ppt/slides/slide5.xml><?xml version="1.0" encoding="utf-8"?>
+<p:sld xmlns:a="http://schemas.openxmlformats.org/drawingml/2006/main" xmlns:r="http://schemas.openxmlformats.org/officeDocument/2006/relationships" xmlns:p="http://schemas.openxmlformats.org/presentationml/2006/main">
+  <p:cSld>
+    <p:spTree>
+      <p:nvGrpSpPr>
+        <p:cNvPr id="1" name=""/>
+        <p:cNvGrpSpPr/>
+        <p:nvPr/>
+      </p:nvGrpSpPr>
+      <p:grpSpPr>
+        <a:xfrm>
+          <a:off x="0" y="0"/>
+          <a:ext cx="0" cy="0"/>
+          <a:chOff x="0" y="0"/>
+          <a:chExt cx="0" cy="0"/>
+        </a:xfrm>
+      </p:grpSpPr>
+      <p:sp>
+        <p:nvSpPr>
+          <p:cNvPr id="2" name="Title 1">
+            <a:extLst>
+              <a:ext uri="{FF2B5EF4-FFF2-40B4-BE49-F238E27FC236}">
+                <a16:creationId xmlns:a16="http://schemas.microsoft.com/office/drawing/2014/main" id="{EE523BD8-7A95-1AA5-5AE6-9432D1307AC3}"/>
+              </a:ext>
+            </a:extLst>
+          </p:cNvPr>
+          <p:cNvSpPr>
+            <a:spLocks noGrp="1"/>
+          </p:cNvSpPr>
+          <p:nvPr>
+            <p:ph type="title"/>
+          </p:nvPr>
+        </p:nvSpPr>
+        <p:spPr/>
+        <p:txBody>
+          <a:bodyPr/>
+          <a:lstStyle/>
+          <a:p>
+            <a:r>
+              <a:rPr lang="en-US" dirty="0"/>
+              <a:t>Data segregation</a:t>
+            </a:r>
+            <a:endParaRPr lang="en-GB" dirty="0"/>
+          </a:p>
+        </p:txBody>
+      </p:sp>
+      <p:sp>
+        <p:nvSpPr>
+          <p:cNvPr id="3" name="Content Placeholder 2">
+            <a:extLst>
+              <a:ext uri="{FF2B5EF4-FFF2-40B4-BE49-F238E27FC236}">
+                <a16:creationId xmlns:a16="http://schemas.microsoft.com/office/drawing/2014/main" id="{E8E002E2-5EE4-3063-81A4-8AA5072E1C79}"/>
+              </a:ext>
+            </a:extLst>
+          </p:cNvPr>
+          <p:cNvSpPr>
+            <a:spLocks noGrp="1"/>
+          </p:cNvSpPr>
+          <p:nvPr>
+            <p:ph idx="1"/>
+          </p:nvPr>
+        </p:nvSpPr>
+        <p:spPr/>
+        <p:txBody>
+          <a:bodyPr>
+            <a:normAutofit/>
+          </a:bodyPr>
+          <a:lstStyle/>
+          <a:p>
+            <a:endParaRPr lang="en-US" dirty="0"/>
+          </a:p>
+          <a:p>
+            <a:endParaRPr lang="en-US" dirty="0"/>
+          </a:p>
+          <a:p>
+            <a:r>
+              <a:rPr lang="en-US" dirty="0"/>
+              <a:t>Overfitting</a:t>
+            </a:r>
+          </a:p>
+          <a:p>
+            <a:endParaRPr lang="en-US" dirty="0"/>
+          </a:p>
+          <a:p>
+            <a:endParaRPr lang="en-US" dirty="0"/>
+          </a:p>
+          <a:p>
+            <a:endParaRPr lang="en-US" dirty="0"/>
+          </a:p>
+          <a:p>
+            <a:pPr marL="0" indent="0">
+              <a:buNone/>
+            </a:pPr>
+            <a:endParaRPr lang="en-US" dirty="0"/>
+          </a:p>
+          <a:p>
+            <a:r>
+              <a:rPr lang="en-US" dirty="0"/>
+              <a:t>Train, test and validate!</a:t>
+            </a:r>
+            <a:endParaRPr lang="en-GB" dirty="0"/>
+          </a:p>
+        </p:txBody>
+      </p:sp>
+      <p:pic>
+        <p:nvPicPr>
+          <p:cNvPr id="5" name="Picture 4" descr="Diagram&#10;&#10;Description automatically generated">
+            <a:extLst>
+              <a:ext uri="{FF2B5EF4-FFF2-40B4-BE49-F238E27FC236}">
+                <a16:creationId xmlns:a16="http://schemas.microsoft.com/office/drawing/2014/main" id="{1D61F28C-7B0E-727A-E794-9E093D161F49}"/>
+              </a:ext>
+            </a:extLst>
+          </p:cNvPr>
+          <p:cNvPicPr>
+            <a:picLocks noChangeAspect="1"/>
+          </p:cNvPicPr>
+          <p:nvPr/>
+        </p:nvPicPr>
+        <p:blipFill>
+          <a:blip r:embed="rId2">
+            <a:extLst>
+              <a:ext uri="{28A0092B-C50C-407E-A947-70E740481C1C}">
+                <a14:useLocalDpi xmlns:a14="http://schemas.microsoft.com/office/drawing/2010/main" val="0"/>
+              </a:ext>
+            </a:extLst>
+          </a:blip>
+          <a:stretch>
+            <a:fillRect/>
+          </a:stretch>
+        </p:blipFill>
+        <p:spPr>
+          <a:xfrm>
+            <a:off x="3962400" y="1476556"/>
+            <a:ext cx="7871791" cy="3428165"/>
+          </a:xfrm>
+          <a:prstGeom prst="rect">
+            <a:avLst/>
+          </a:prstGeom>
+        </p:spPr>
+      </p:pic>
+    </p:spTree>
+    <p:extLst>
+      <p:ext uri="{BB962C8B-B14F-4D97-AF65-F5344CB8AC3E}">
+        <p14:creationId xmlns:p14="http://schemas.microsoft.com/office/powerpoint/2010/main" val="2219305440"/>
+      </p:ext>
+    </p:extLst>
+  </p:cSld>
+  <p:clrMapOvr>
+    <a:masterClrMapping/>
+  </p:clrMapOvr>
+</p:sld>
+</file>
+
 <file path=ppt/slides/slide6.xml><?xml version="1.0" encoding="utf-8"?>
 <p:sld xmlns:a="http://schemas.openxmlformats.org/drawingml/2006/main" xmlns:r="http://schemas.openxmlformats.org/officeDocument/2006/relationships" xmlns:p="http://schemas.openxmlformats.org/presentationml/2006/main">
   <p:cSld>
@@ -6961,7 +7027,7 @@
           <p:cNvPr id="2" name="Title 1">
             <a:extLst>
               <a:ext uri="{FF2B5EF4-FFF2-40B4-BE49-F238E27FC236}">
-                <a16:creationId xmlns:a16="http://schemas.microsoft.com/office/drawing/2014/main" id="{31B0AB87-8C6F-EE93-5D0D-457424FBB46E}"/>
+                <a16:creationId xmlns:a16="http://schemas.microsoft.com/office/drawing/2014/main" id="{61661C0B-24A3-FB18-22EE-47BAEA3A839D}"/>
               </a:ext>
             </a:extLst>
           </p:cNvPr>
@@ -6979,7 +7045,7 @@
           <a:p>
             <a:r>
               <a:rPr lang="en-US" dirty="0"/>
-              <a:t>Hyperparameters</a:t>
+              <a:t>Dipeptide self-assembly</a:t>
             </a:r>
             <a:endParaRPr lang="en-GB" dirty="0"/>
           </a:p>
@@ -6987,33 +7053,443 @@
       </p:sp>
       <p:sp>
         <p:nvSpPr>
-          <p:cNvPr id="3" name="Content Placeholder 2">
-            <a:extLst>
-              <a:ext uri="{FF2B5EF4-FFF2-40B4-BE49-F238E27FC236}">
-                <a16:creationId xmlns:a16="http://schemas.microsoft.com/office/drawing/2014/main" id="{2EFFE7F0-3BDA-A2C3-1583-E447E6959E9A}"/>
-              </a:ext>
-            </a:extLst>
-          </p:cNvPr>
-          <p:cNvSpPr>
-            <a:spLocks noGrp="1"/>
-          </p:cNvSpPr>
-          <p:nvPr>
-            <p:ph idx="1"/>
-          </p:nvPr>
-        </p:nvSpPr>
-        <p:spPr/>
-        <p:txBody>
-          <a:bodyPr/>
+          <p:cNvPr id="4" name="Rectangle 3">
+            <a:extLst>
+              <a:ext uri="{FF2B5EF4-FFF2-40B4-BE49-F238E27FC236}">
+                <a16:creationId xmlns:a16="http://schemas.microsoft.com/office/drawing/2014/main" id="{249F1859-12B1-6F7E-4D0C-250C62399331}"/>
+              </a:ext>
+            </a:extLst>
+          </p:cNvPr>
+          <p:cNvSpPr/>
+          <p:nvPr/>
+        </p:nvSpPr>
+        <p:spPr>
+          <a:xfrm>
+            <a:off x="4630993" y="1513707"/>
+            <a:ext cx="2359742" cy="988142"/>
+          </a:xfrm>
+          <a:prstGeom prst="rect">
+            <a:avLst/>
+          </a:prstGeom>
+        </p:spPr>
+        <p:style>
+          <a:lnRef idx="2">
+            <a:schemeClr val="accent1">
+              <a:shade val="50000"/>
+            </a:schemeClr>
+          </a:lnRef>
+          <a:fillRef idx="1">
+            <a:schemeClr val="accent1"/>
+          </a:fillRef>
+          <a:effectRef idx="0">
+            <a:schemeClr val="accent1"/>
+          </a:effectRef>
+          <a:fontRef idx="minor">
+            <a:schemeClr val="lt1"/>
+          </a:fontRef>
+        </p:style>
+        <p:txBody>
+          <a:bodyPr rtlCol="0" anchor="ctr"/>
           <a:lstStyle/>
           <a:p>
+            <a:pPr algn="ctr"/>
+            <a:r>
+              <a:rPr lang="en-US" dirty="0"/>
+              <a:t>400 datapoints (20</a:t>
+            </a:r>
+            <a:r>
+              <a:rPr lang="en-US" baseline="30000" dirty="0"/>
+              <a:t>2</a:t>
+            </a:r>
+            <a:r>
+              <a:rPr lang="en-US" dirty="0"/>
+              <a:t>)</a:t>
+            </a:r>
             <a:endParaRPr lang="en-GB" dirty="0"/>
           </a:p>
         </p:txBody>
       </p:sp>
+      <p:sp>
+        <p:nvSpPr>
+          <p:cNvPr id="5" name="Rectangle 4">
+            <a:extLst>
+              <a:ext uri="{FF2B5EF4-FFF2-40B4-BE49-F238E27FC236}">
+                <a16:creationId xmlns:a16="http://schemas.microsoft.com/office/drawing/2014/main" id="{E22128C6-4EE1-D7AF-9C50-31F11CED95FA}"/>
+              </a:ext>
+            </a:extLst>
+          </p:cNvPr>
+          <p:cNvSpPr/>
+          <p:nvPr/>
+        </p:nvSpPr>
+        <p:spPr>
+          <a:xfrm>
+            <a:off x="2964425" y="2930218"/>
+            <a:ext cx="2359742" cy="988142"/>
+          </a:xfrm>
+          <a:prstGeom prst="rect">
+            <a:avLst/>
+          </a:prstGeom>
+        </p:spPr>
+        <p:style>
+          <a:lnRef idx="2">
+            <a:schemeClr val="accent1">
+              <a:shade val="50000"/>
+            </a:schemeClr>
+          </a:lnRef>
+          <a:fillRef idx="1">
+            <a:schemeClr val="accent1"/>
+          </a:fillRef>
+          <a:effectRef idx="0">
+            <a:schemeClr val="accent1"/>
+          </a:effectRef>
+          <a:fontRef idx="minor">
+            <a:schemeClr val="lt1"/>
+          </a:fontRef>
+        </p:style>
+        <p:txBody>
+          <a:bodyPr rtlCol="0" anchor="ctr"/>
+          <a:lstStyle/>
+          <a:p>
+            <a:pPr algn="ctr"/>
+            <a:r>
+              <a:rPr lang="en-US" dirty="0"/>
+              <a:t>268 training points</a:t>
+            </a:r>
+            <a:endParaRPr lang="en-GB" dirty="0"/>
+          </a:p>
+        </p:txBody>
+      </p:sp>
+      <p:sp>
+        <p:nvSpPr>
+          <p:cNvPr id="6" name="Rectangle 5">
+            <a:extLst>
+              <a:ext uri="{FF2B5EF4-FFF2-40B4-BE49-F238E27FC236}">
+                <a16:creationId xmlns:a16="http://schemas.microsoft.com/office/drawing/2014/main" id="{DD08FB57-953D-1CEF-93E4-69C744176170}"/>
+              </a:ext>
+            </a:extLst>
+          </p:cNvPr>
+          <p:cNvSpPr/>
+          <p:nvPr/>
+        </p:nvSpPr>
+        <p:spPr>
+          <a:xfrm>
+            <a:off x="6248400" y="2930218"/>
+            <a:ext cx="2359742" cy="988142"/>
+          </a:xfrm>
+          <a:prstGeom prst="rect">
+            <a:avLst/>
+          </a:prstGeom>
+        </p:spPr>
+        <p:style>
+          <a:lnRef idx="2">
+            <a:schemeClr val="accent1">
+              <a:shade val="50000"/>
+            </a:schemeClr>
+          </a:lnRef>
+          <a:fillRef idx="1">
+            <a:schemeClr val="accent1"/>
+          </a:fillRef>
+          <a:effectRef idx="0">
+            <a:schemeClr val="accent1"/>
+          </a:effectRef>
+          <a:fontRef idx="minor">
+            <a:schemeClr val="lt1"/>
+          </a:fontRef>
+        </p:style>
+        <p:txBody>
+          <a:bodyPr rtlCol="0" anchor="ctr"/>
+          <a:lstStyle/>
+          <a:p>
+            <a:pPr algn="ctr"/>
+            <a:r>
+              <a:rPr lang="en-US" dirty="0"/>
+              <a:t>132 validation points</a:t>
+            </a:r>
+            <a:endParaRPr lang="en-GB" dirty="0"/>
+          </a:p>
+        </p:txBody>
+      </p:sp>
+      <p:sp>
+        <p:nvSpPr>
+          <p:cNvPr id="7" name="Rectangle 6">
+            <a:extLst>
+              <a:ext uri="{FF2B5EF4-FFF2-40B4-BE49-F238E27FC236}">
+                <a16:creationId xmlns:a16="http://schemas.microsoft.com/office/drawing/2014/main" id="{C3A1ED75-8566-AACC-DC89-78A7B33DA839}"/>
+              </a:ext>
+            </a:extLst>
+          </p:cNvPr>
+          <p:cNvSpPr/>
+          <p:nvPr/>
+        </p:nvSpPr>
+        <p:spPr>
+          <a:xfrm>
+            <a:off x="1340054" y="4599244"/>
+            <a:ext cx="2359742" cy="988142"/>
+          </a:xfrm>
+          <a:prstGeom prst="rect">
+            <a:avLst/>
+          </a:prstGeom>
+        </p:spPr>
+        <p:style>
+          <a:lnRef idx="2">
+            <a:schemeClr val="accent1">
+              <a:shade val="50000"/>
+            </a:schemeClr>
+          </a:lnRef>
+          <a:fillRef idx="1">
+            <a:schemeClr val="accent1"/>
+          </a:fillRef>
+          <a:effectRef idx="0">
+            <a:schemeClr val="accent1"/>
+          </a:effectRef>
+          <a:fontRef idx="minor">
+            <a:schemeClr val="lt1"/>
+          </a:fontRef>
+        </p:style>
+        <p:txBody>
+          <a:bodyPr rtlCol="0" anchor="ctr"/>
+          <a:lstStyle/>
+          <a:p>
+            <a:pPr algn="ctr"/>
+            <a:r>
+              <a:rPr lang="en-US" dirty="0"/>
+              <a:t>179 training points</a:t>
+            </a:r>
+            <a:endParaRPr lang="en-GB" dirty="0"/>
+          </a:p>
+        </p:txBody>
+      </p:sp>
+      <p:sp>
+        <p:nvSpPr>
+          <p:cNvPr id="8" name="Rectangle 7">
+            <a:extLst>
+              <a:ext uri="{FF2B5EF4-FFF2-40B4-BE49-F238E27FC236}">
+                <a16:creationId xmlns:a16="http://schemas.microsoft.com/office/drawing/2014/main" id="{E2056722-47E6-C415-7241-633F3F8B9C84}"/>
+              </a:ext>
+            </a:extLst>
+          </p:cNvPr>
+          <p:cNvSpPr/>
+          <p:nvPr/>
+        </p:nvSpPr>
+        <p:spPr>
+          <a:xfrm>
+            <a:off x="4471629" y="4599244"/>
+            <a:ext cx="2359742" cy="988142"/>
+          </a:xfrm>
+          <a:prstGeom prst="rect">
+            <a:avLst/>
+          </a:prstGeom>
+        </p:spPr>
+        <p:style>
+          <a:lnRef idx="2">
+            <a:schemeClr val="accent1">
+              <a:shade val="50000"/>
+            </a:schemeClr>
+          </a:lnRef>
+          <a:fillRef idx="1">
+            <a:schemeClr val="accent1"/>
+          </a:fillRef>
+          <a:effectRef idx="0">
+            <a:schemeClr val="accent1"/>
+          </a:effectRef>
+          <a:fontRef idx="minor">
+            <a:schemeClr val="lt1"/>
+          </a:fontRef>
+        </p:style>
+        <p:txBody>
+          <a:bodyPr rtlCol="0" anchor="ctr"/>
+          <a:lstStyle/>
+          <a:p>
+            <a:pPr algn="ctr"/>
+            <a:r>
+              <a:rPr lang="en-US" dirty="0"/>
+              <a:t>89 testing points</a:t>
+            </a:r>
+            <a:endParaRPr lang="en-GB" dirty="0"/>
+          </a:p>
+        </p:txBody>
+      </p:sp>
+      <p:cxnSp>
+        <p:nvCxnSpPr>
+          <p:cNvPr id="14" name="Connector: Elbow 13">
+            <a:extLst>
+              <a:ext uri="{FF2B5EF4-FFF2-40B4-BE49-F238E27FC236}">
+                <a16:creationId xmlns:a16="http://schemas.microsoft.com/office/drawing/2014/main" id="{A21F4E28-F7E6-B79E-D74E-2C6E12AE5174}"/>
+              </a:ext>
+            </a:extLst>
+          </p:cNvPr>
+          <p:cNvCxnSpPr>
+            <a:stCxn id="4" idx="2"/>
+            <a:endCxn id="5" idx="0"/>
+          </p:cNvCxnSpPr>
+          <p:nvPr/>
+        </p:nvCxnSpPr>
+        <p:spPr>
+          <a:xfrm rot="5400000">
+            <a:off x="4763396" y="1882749"/>
+            <a:ext cx="428369" cy="1666568"/>
+          </a:xfrm>
+          <a:prstGeom prst="bentConnector3">
+            <a:avLst/>
+          </a:prstGeom>
+          <a:ln>
+            <a:tailEnd type="triangle"/>
+          </a:ln>
+        </p:spPr>
+        <p:style>
+          <a:lnRef idx="1">
+            <a:schemeClr val="accent1"/>
+          </a:lnRef>
+          <a:fillRef idx="0">
+            <a:schemeClr val="accent1"/>
+          </a:fillRef>
+          <a:effectRef idx="0">
+            <a:schemeClr val="accent1"/>
+          </a:effectRef>
+          <a:fontRef idx="minor">
+            <a:schemeClr val="tx1"/>
+          </a:fontRef>
+        </p:style>
+      </p:cxnSp>
+      <p:cxnSp>
+        <p:nvCxnSpPr>
+          <p:cNvPr id="15" name="Connector: Elbow 14">
+            <a:extLst>
+              <a:ext uri="{FF2B5EF4-FFF2-40B4-BE49-F238E27FC236}">
+                <a16:creationId xmlns:a16="http://schemas.microsoft.com/office/drawing/2014/main" id="{A6FB7BBB-F7E9-72A4-DF6D-2B3DE87C9759}"/>
+              </a:ext>
+            </a:extLst>
+          </p:cNvPr>
+          <p:cNvCxnSpPr>
+            <a:cxnSpLocks/>
+            <a:stCxn id="4" idx="2"/>
+            <a:endCxn id="6" idx="0"/>
+          </p:cNvCxnSpPr>
+          <p:nvPr/>
+        </p:nvCxnSpPr>
+        <p:spPr>
+          <a:xfrm rot="16200000" flipH="1">
+            <a:off x="6405383" y="1907329"/>
+            <a:ext cx="428369" cy="1617407"/>
+          </a:xfrm>
+          <a:prstGeom prst="bentConnector3">
+            <a:avLst>
+              <a:gd name="adj1" fmla="val 50000"/>
+            </a:avLst>
+          </a:prstGeom>
+          <a:ln>
+            <a:tailEnd type="triangle"/>
+          </a:ln>
+        </p:spPr>
+        <p:style>
+          <a:lnRef idx="1">
+            <a:schemeClr val="accent1"/>
+          </a:lnRef>
+          <a:fillRef idx="0">
+            <a:schemeClr val="accent1"/>
+          </a:fillRef>
+          <a:effectRef idx="0">
+            <a:schemeClr val="accent1"/>
+          </a:effectRef>
+          <a:fontRef idx="minor">
+            <a:schemeClr val="tx1"/>
+          </a:fontRef>
+        </p:style>
+      </p:cxnSp>
+      <p:cxnSp>
+        <p:nvCxnSpPr>
+          <p:cNvPr id="18" name="Connector: Elbow 17">
+            <a:extLst>
+              <a:ext uri="{FF2B5EF4-FFF2-40B4-BE49-F238E27FC236}">
+                <a16:creationId xmlns:a16="http://schemas.microsoft.com/office/drawing/2014/main" id="{C552CB5E-D98A-BDBB-9BCC-757CDF8F081E}"/>
+              </a:ext>
+            </a:extLst>
+          </p:cNvPr>
+          <p:cNvCxnSpPr>
+            <a:cxnSpLocks/>
+            <a:stCxn id="5" idx="2"/>
+            <a:endCxn id="8" idx="0"/>
+          </p:cNvCxnSpPr>
+          <p:nvPr/>
+        </p:nvCxnSpPr>
+        <p:spPr>
+          <a:xfrm rot="16200000" flipH="1">
+            <a:off x="4557456" y="3505200"/>
+            <a:ext cx="680884" cy="1507204"/>
+          </a:xfrm>
+          <a:prstGeom prst="bentConnector3">
+            <a:avLst>
+              <a:gd name="adj1" fmla="val 50000"/>
+            </a:avLst>
+          </a:prstGeom>
+          <a:ln>
+            <a:tailEnd type="triangle"/>
+          </a:ln>
+        </p:spPr>
+        <p:style>
+          <a:lnRef idx="1">
+            <a:schemeClr val="accent1"/>
+          </a:lnRef>
+          <a:fillRef idx="0">
+            <a:schemeClr val="accent1"/>
+          </a:fillRef>
+          <a:effectRef idx="0">
+            <a:schemeClr val="accent1"/>
+          </a:effectRef>
+          <a:fontRef idx="minor">
+            <a:schemeClr val="tx1"/>
+          </a:fontRef>
+        </p:style>
+      </p:cxnSp>
+      <p:cxnSp>
+        <p:nvCxnSpPr>
+          <p:cNvPr id="21" name="Connector: Elbow 20">
+            <a:extLst>
+              <a:ext uri="{FF2B5EF4-FFF2-40B4-BE49-F238E27FC236}">
+                <a16:creationId xmlns:a16="http://schemas.microsoft.com/office/drawing/2014/main" id="{21522050-9CEF-AFEE-BDA8-82BBD329FEEB}"/>
+              </a:ext>
+            </a:extLst>
+          </p:cNvPr>
+          <p:cNvCxnSpPr>
+            <a:cxnSpLocks/>
+            <a:stCxn id="5" idx="2"/>
+            <a:endCxn id="7" idx="0"/>
+          </p:cNvCxnSpPr>
+          <p:nvPr/>
+        </p:nvCxnSpPr>
+        <p:spPr>
+          <a:xfrm rot="5400000">
+            <a:off x="2991669" y="3446617"/>
+            <a:ext cx="680884" cy="1624371"/>
+          </a:xfrm>
+          <a:prstGeom prst="bentConnector3">
+            <a:avLst>
+              <a:gd name="adj1" fmla="val 50000"/>
+            </a:avLst>
+          </a:prstGeom>
+          <a:ln>
+            <a:tailEnd type="triangle"/>
+          </a:ln>
+        </p:spPr>
+        <p:style>
+          <a:lnRef idx="1">
+            <a:schemeClr val="accent1"/>
+          </a:lnRef>
+          <a:fillRef idx="0">
+            <a:schemeClr val="accent1"/>
+          </a:fillRef>
+          <a:effectRef idx="0">
+            <a:schemeClr val="accent1"/>
+          </a:effectRef>
+          <a:fontRef idx="minor">
+            <a:schemeClr val="tx1"/>
+          </a:fontRef>
+        </p:style>
+      </p:cxnSp>
     </p:spTree>
     <p:extLst>
       <p:ext uri="{BB962C8B-B14F-4D97-AF65-F5344CB8AC3E}">
-        <p14:creationId xmlns:p14="http://schemas.microsoft.com/office/powerpoint/2010/main" val="1092923729"/>
+        <p14:creationId xmlns:p14="http://schemas.microsoft.com/office/powerpoint/2010/main" val="2835371536"/>
       </p:ext>
     </p:extLst>
   </p:cSld>
@@ -7045,7 +7521,7 @@
           <p:cNvPr id="2" name="Title 1">
             <a:extLst>
               <a:ext uri="{FF2B5EF4-FFF2-40B4-BE49-F238E27FC236}">
-                <a16:creationId xmlns:a16="http://schemas.microsoft.com/office/drawing/2014/main" id="{84F928A3-572E-A77B-6FCB-3C2494B0C449}"/>
+                <a16:creationId xmlns:a16="http://schemas.microsoft.com/office/drawing/2014/main" id="{31B0AB87-8C6F-EE93-5D0D-457424FBB46E}"/>
               </a:ext>
             </a:extLst>
           </p:cNvPr>
@@ -7063,46 +7539,163 @@
           <a:p>
             <a:r>
               <a:rPr lang="en-US" dirty="0"/>
-              <a:t>Can we predict something harder?</a:t>
+              <a:t>Hyperparameters</a:t>
             </a:r>
             <a:endParaRPr lang="en-GB" dirty="0"/>
           </a:p>
         </p:txBody>
       </p:sp>
-      <p:pic>
-        <p:nvPicPr>
-          <p:cNvPr id="4" name="Picture 3">
-            <a:extLst>
-              <a:ext uri="{FF2B5EF4-FFF2-40B4-BE49-F238E27FC236}">
-                <a16:creationId xmlns:a16="http://schemas.microsoft.com/office/drawing/2014/main" id="{DE63A5CA-41FD-70D8-6BFA-D694E43C10A7}"/>
-              </a:ext>
-            </a:extLst>
-          </p:cNvPr>
-          <p:cNvPicPr>
-            <a:picLocks noChangeAspect="1"/>
-          </p:cNvPicPr>
+      <p:sp>
+        <p:nvSpPr>
+          <p:cNvPr id="3" name="Content Placeholder 2">
+            <a:extLst>
+              <a:ext uri="{FF2B5EF4-FFF2-40B4-BE49-F238E27FC236}">
+                <a16:creationId xmlns:a16="http://schemas.microsoft.com/office/drawing/2014/main" id="{2EFFE7F0-3BDA-A2C3-1583-E447E6959E9A}"/>
+              </a:ext>
+            </a:extLst>
+          </p:cNvPr>
+          <p:cNvSpPr>
+            <a:spLocks noGrp="1"/>
+          </p:cNvSpPr>
+          <p:nvPr>
+            <p:ph idx="1"/>
+          </p:nvPr>
+        </p:nvSpPr>
+        <p:spPr/>
+        <p:txBody>
+          <a:bodyPr/>
+          <a:lstStyle/>
+          <a:p>
+            <a:r>
+              <a:rPr lang="en-US" dirty="0"/>
+              <a:t>Other parameters that effect the fit of the data</a:t>
+            </a:r>
+            <a:endParaRPr lang="en-GB" dirty="0"/>
+          </a:p>
+        </p:txBody>
+      </p:sp>
+      <p:sp>
+        <p:nvSpPr>
+          <p:cNvPr id="6" name="TextBox 5">
+            <a:extLst>
+              <a:ext uri="{FF2B5EF4-FFF2-40B4-BE49-F238E27FC236}">
+                <a16:creationId xmlns:a16="http://schemas.microsoft.com/office/drawing/2014/main" id="{CDBE25FB-22A1-B7AA-46DB-7D6BF0BA0892}"/>
+              </a:ext>
+            </a:extLst>
+          </p:cNvPr>
+          <p:cNvSpPr txBox="1"/>
           <p:nvPr/>
-        </p:nvPicPr>
-        <p:blipFill>
-          <a:blip r:embed="rId2"/>
-          <a:stretch>
-            <a:fillRect/>
-          </a:stretch>
-        </p:blipFill>
+        </p:nvSpPr>
         <p:spPr>
           <a:xfrm>
-            <a:off x="6762750" y="1929606"/>
-            <a:ext cx="4591050" cy="4143375"/>
+            <a:off x="3882887" y="2554744"/>
+            <a:ext cx="4426225" cy="707886"/>
           </a:xfrm>
           <a:prstGeom prst="rect">
             <a:avLst/>
           </a:prstGeom>
+          <a:noFill/>
         </p:spPr>
-      </p:pic>
+        <p:txBody>
+          <a:bodyPr wrap="square" rtlCol="0">
+            <a:spAutoFit/>
+          </a:bodyPr>
+          <a:lstStyle/>
+          <a:p>
+            <a:r>
+              <a:rPr lang="en-GB" sz="4000" dirty="0"/>
+              <a:t>y=abs(m)? x (+b)</a:t>
+            </a:r>
+          </a:p>
+        </p:txBody>
+      </p:sp>
+      <p:sp>
+        <p:nvSpPr>
+          <p:cNvPr id="8" name="TextBox 7">
+            <a:extLst>
+              <a:ext uri="{FF2B5EF4-FFF2-40B4-BE49-F238E27FC236}">
+                <a16:creationId xmlns:a16="http://schemas.microsoft.com/office/drawing/2014/main" id="{754ADD7F-3792-7E97-D546-F4EA5936744E}"/>
+              </a:ext>
+            </a:extLst>
+          </p:cNvPr>
+          <p:cNvSpPr txBox="1"/>
+          <p:nvPr/>
+        </p:nvSpPr>
+        <p:spPr>
+          <a:xfrm>
+            <a:off x="4572000" y="3397567"/>
+            <a:ext cx="6096000" cy="1477328"/>
+          </a:xfrm>
+          <a:prstGeom prst="rect">
+            <a:avLst/>
+          </a:prstGeom>
+          <a:noFill/>
+        </p:spPr>
+        <p:txBody>
+          <a:bodyPr wrap="square">
+            <a:spAutoFit/>
+          </a:bodyPr>
+          <a:lstStyle/>
+          <a:p>
+            <a:r>
+              <a:rPr lang="en-GB" dirty="0"/>
+              <a:t> </a:t>
+            </a:r>
+            <a:r>
+              <a:rPr lang="en-GB" dirty="0" err="1"/>
+              <a:t>fit_intercept</a:t>
+            </a:r>
+            <a:r>
+              <a:rPr lang="en-GB" dirty="0"/>
+              <a:t> positive  Test data RMSE</a:t>
+            </a:r>
+          </a:p>
+          <a:p>
+            <a:r>
+              <a:rPr lang="en-GB" dirty="0"/>
+              <a:t>2         False     True        0.810048</a:t>
+            </a:r>
+          </a:p>
+          <a:p>
+            <a:r>
+              <a:rPr lang="en-GB" dirty="0"/>
+              <a:t>3         False    </a:t>
+            </a:r>
+            <a:r>
+              <a:rPr lang="en-GB" dirty="0" err="1"/>
+              <a:t>False</a:t>
+            </a:r>
+            <a:r>
+              <a:rPr lang="en-GB" dirty="0"/>
+              <a:t>        0.233584</a:t>
+            </a:r>
+          </a:p>
+          <a:p>
+            <a:r>
+              <a:rPr lang="en-GB" dirty="0"/>
+              <a:t>0          True     </a:t>
+            </a:r>
+            <a:r>
+              <a:rPr lang="en-GB" dirty="0" err="1"/>
+              <a:t>True</a:t>
+            </a:r>
+            <a:r>
+              <a:rPr lang="en-GB" dirty="0"/>
+              <a:t>        0.171678</a:t>
+            </a:r>
+          </a:p>
+          <a:p>
+            <a:r>
+              <a:rPr lang="en-GB" dirty="0"/>
+              <a:t>1          True    False        0.169679</a:t>
+            </a:r>
+          </a:p>
+        </p:txBody>
+      </p:sp>
     </p:spTree>
     <p:extLst>
       <p:ext uri="{BB962C8B-B14F-4D97-AF65-F5344CB8AC3E}">
-        <p14:creationId xmlns:p14="http://schemas.microsoft.com/office/powerpoint/2010/main" val="1358280357"/>
+        <p14:creationId xmlns:p14="http://schemas.microsoft.com/office/powerpoint/2010/main" val="1092923729"/>
       </p:ext>
     </p:extLst>
   </p:cSld>
@@ -7134,7 +7727,7 @@
           <p:cNvPr id="2" name="Title 1">
             <a:extLst>
               <a:ext uri="{FF2B5EF4-FFF2-40B4-BE49-F238E27FC236}">
-                <a16:creationId xmlns:a16="http://schemas.microsoft.com/office/drawing/2014/main" id="{0D82FABD-4661-9ADA-AAC5-9C047BF8A94F}"/>
+                <a16:creationId xmlns:a16="http://schemas.microsoft.com/office/drawing/2014/main" id="{84F928A3-572E-A77B-6FCB-3C2494B0C449}"/>
               </a:ext>
             </a:extLst>
           </p:cNvPr>
@@ -7150,39 +7743,78 @@
           <a:bodyPr/>
           <a:lstStyle/>
           <a:p>
-            <a:endParaRPr lang="en-GB"/>
-          </a:p>
-        </p:txBody>
-      </p:sp>
-      <p:sp>
-        <p:nvSpPr>
-          <p:cNvPr id="3" name="Content Placeholder 2">
-            <a:extLst>
-              <a:ext uri="{FF2B5EF4-FFF2-40B4-BE49-F238E27FC236}">
-                <a16:creationId xmlns:a16="http://schemas.microsoft.com/office/drawing/2014/main" id="{D1229B21-DB4A-76E3-3ABB-CC4558A883E0}"/>
-              </a:ext>
-            </a:extLst>
-          </p:cNvPr>
-          <p:cNvSpPr>
-            <a:spLocks noGrp="1"/>
-          </p:cNvSpPr>
-          <p:nvPr>
-            <p:ph idx="1"/>
-          </p:nvPr>
-        </p:nvSpPr>
-        <p:spPr/>
-        <p:txBody>
-          <a:bodyPr/>
-          <a:lstStyle/>
-          <a:p>
-            <a:endParaRPr lang="en-GB"/>
-          </a:p>
-        </p:txBody>
-      </p:sp>
+            <a:r>
+              <a:rPr lang="en-US" dirty="0"/>
+              <a:t>Can we predict something harder?</a:t>
+            </a:r>
+            <a:endParaRPr lang="en-GB" dirty="0"/>
+          </a:p>
+        </p:txBody>
+      </p:sp>
+      <p:pic>
+        <p:nvPicPr>
+          <p:cNvPr id="4" name="Picture 3">
+            <a:extLst>
+              <a:ext uri="{FF2B5EF4-FFF2-40B4-BE49-F238E27FC236}">
+                <a16:creationId xmlns:a16="http://schemas.microsoft.com/office/drawing/2014/main" id="{DE63A5CA-41FD-70D8-6BFA-D694E43C10A7}"/>
+              </a:ext>
+            </a:extLst>
+          </p:cNvPr>
+          <p:cNvPicPr>
+            <a:picLocks noChangeAspect="1"/>
+          </p:cNvPicPr>
+          <p:nvPr/>
+        </p:nvPicPr>
+        <p:blipFill>
+          <a:blip r:embed="rId2"/>
+          <a:stretch>
+            <a:fillRect/>
+          </a:stretch>
+        </p:blipFill>
+        <p:spPr>
+          <a:xfrm>
+            <a:off x="6762750" y="1929606"/>
+            <a:ext cx="4591050" cy="4143375"/>
+          </a:xfrm>
+          <a:prstGeom prst="rect">
+            <a:avLst/>
+          </a:prstGeom>
+        </p:spPr>
+      </p:pic>
+      <p:pic>
+        <p:nvPicPr>
+          <p:cNvPr id="10" name="Picture 9">
+            <a:extLst>
+              <a:ext uri="{FF2B5EF4-FFF2-40B4-BE49-F238E27FC236}">
+                <a16:creationId xmlns:a16="http://schemas.microsoft.com/office/drawing/2014/main" id="{7E31DBDB-62B5-5608-E5E7-DC2EE54CD81A}"/>
+              </a:ext>
+            </a:extLst>
+          </p:cNvPr>
+          <p:cNvPicPr>
+            <a:picLocks noChangeAspect="1"/>
+          </p:cNvPicPr>
+          <p:nvPr/>
+        </p:nvPicPr>
+        <p:blipFill>
+          <a:blip r:embed="rId3"/>
+          <a:stretch>
+            <a:fillRect/>
+          </a:stretch>
+        </p:blipFill>
+        <p:spPr>
+          <a:xfrm>
+            <a:off x="838200" y="2048668"/>
+            <a:ext cx="5657850" cy="3905250"/>
+          </a:xfrm>
+          <a:prstGeom prst="rect">
+            <a:avLst/>
+          </a:prstGeom>
+        </p:spPr>
+      </p:pic>
     </p:spTree>
     <p:extLst>
       <p:ext uri="{BB962C8B-B14F-4D97-AF65-F5344CB8AC3E}">
-        <p14:creationId xmlns:p14="http://schemas.microsoft.com/office/powerpoint/2010/main" val="2057029144"/>
+        <p14:creationId xmlns:p14="http://schemas.microsoft.com/office/powerpoint/2010/main" val="1358280357"/>
       </p:ext>
     </p:extLst>
   </p:cSld>
@@ -7211,43 +7843,183 @@
       </p:grpSpPr>
       <p:pic>
         <p:nvPicPr>
-          <p:cNvPr id="5" name="Content Placeholder 4" descr="Chart, line chart&#10;&#10;Description automatically generated">
-            <a:extLst>
-              <a:ext uri="{FF2B5EF4-FFF2-40B4-BE49-F238E27FC236}">
-                <a16:creationId xmlns:a16="http://schemas.microsoft.com/office/drawing/2014/main" id="{A6D80025-1B3F-0C30-D5FA-E6CE702D9571}"/>
+          <p:cNvPr id="9" name="Picture 8">
+            <a:extLst>
+              <a:ext uri="{FF2B5EF4-FFF2-40B4-BE49-F238E27FC236}">
+                <a16:creationId xmlns:a16="http://schemas.microsoft.com/office/drawing/2014/main" id="{BD465EE4-9826-B23F-EEAA-A7A3B4B886C5}"/>
               </a:ext>
             </a:extLst>
           </p:cNvPr>
           <p:cNvPicPr>
-            <a:picLocks noGrp="1" noChangeAspect="1"/>
+            <a:picLocks noChangeAspect="1"/>
           </p:cNvPicPr>
-          <p:nvPr>
-            <p:ph idx="1"/>
-          </p:nvPr>
+          <p:nvPr/>
         </p:nvPicPr>
         <p:blipFill>
-          <a:blip r:embed="rId2">
-            <a:extLst>
-              <a:ext uri="{28A0092B-C50C-407E-A947-70E740481C1C}">
-                <a14:useLocalDpi xmlns:a14="http://schemas.microsoft.com/office/drawing/2010/main" val="0"/>
-              </a:ext>
-            </a:extLst>
-          </a:blip>
+          <a:blip r:embed="rId2"/>
           <a:stretch>
             <a:fillRect/>
           </a:stretch>
         </p:blipFill>
         <p:spPr>
           <a:xfrm>
-            <a:off x="3195108" y="1253331"/>
-            <a:ext cx="5801784" cy="4351338"/>
+            <a:off x="3876787" y="1"/>
+            <a:ext cx="4634694" cy="2952749"/>
           </a:xfrm>
+          <a:prstGeom prst="rect">
+            <a:avLst/>
+          </a:prstGeom>
         </p:spPr>
       </p:pic>
+      <p:pic>
+        <p:nvPicPr>
+          <p:cNvPr id="11" name="Picture 10">
+            <a:extLst>
+              <a:ext uri="{FF2B5EF4-FFF2-40B4-BE49-F238E27FC236}">
+                <a16:creationId xmlns:a16="http://schemas.microsoft.com/office/drawing/2014/main" id="{4A0AE863-1CDB-8EAC-06BC-8FD89E2F89B9}"/>
+              </a:ext>
+            </a:extLst>
+          </p:cNvPr>
+          <p:cNvPicPr>
+            <a:picLocks noChangeAspect="1"/>
+          </p:cNvPicPr>
+          <p:nvPr/>
+        </p:nvPicPr>
+        <p:blipFill>
+          <a:blip r:embed="rId3"/>
+          <a:stretch>
+            <a:fillRect/>
+          </a:stretch>
+        </p:blipFill>
+        <p:spPr>
+          <a:xfrm>
+            <a:off x="0" y="3230872"/>
+            <a:ext cx="5099314" cy="3627127"/>
+          </a:xfrm>
+          <a:prstGeom prst="rect">
+            <a:avLst/>
+          </a:prstGeom>
+        </p:spPr>
+      </p:pic>
+      <p:pic>
+        <p:nvPicPr>
+          <p:cNvPr id="13" name="Picture 12">
+            <a:extLst>
+              <a:ext uri="{FF2B5EF4-FFF2-40B4-BE49-F238E27FC236}">
+                <a16:creationId xmlns:a16="http://schemas.microsoft.com/office/drawing/2014/main" id="{4997CF19-6423-274C-FE3C-2D4A6E14D171}"/>
+              </a:ext>
+            </a:extLst>
+          </p:cNvPr>
+          <p:cNvPicPr>
+            <a:picLocks noChangeAspect="1"/>
+          </p:cNvPicPr>
+          <p:nvPr/>
+        </p:nvPicPr>
+        <p:blipFill>
+          <a:blip r:embed="rId4"/>
+          <a:stretch>
+            <a:fillRect/>
+          </a:stretch>
+        </p:blipFill>
+        <p:spPr>
+          <a:xfrm>
+            <a:off x="7092688" y="3230873"/>
+            <a:ext cx="5099314" cy="3627127"/>
+          </a:xfrm>
+          <a:prstGeom prst="rect">
+            <a:avLst/>
+          </a:prstGeom>
+        </p:spPr>
+      </p:pic>
+      <p:cxnSp>
+        <p:nvCxnSpPr>
+          <p:cNvPr id="15" name="Straight Arrow Connector 14">
+            <a:extLst>
+              <a:ext uri="{FF2B5EF4-FFF2-40B4-BE49-F238E27FC236}">
+                <a16:creationId xmlns:a16="http://schemas.microsoft.com/office/drawing/2014/main" id="{3A86EAA5-E07F-B233-60A2-B78CD3756D9D}"/>
+              </a:ext>
+            </a:extLst>
+          </p:cNvPr>
+          <p:cNvCxnSpPr>
+            <a:stCxn id="11" idx="0"/>
+            <a:endCxn id="9" idx="1"/>
+          </p:cNvCxnSpPr>
+          <p:nvPr/>
+        </p:nvCxnSpPr>
+        <p:spPr>
+          <a:xfrm flipV="1">
+            <a:off x="2549657" y="1476376"/>
+            <a:ext cx="1327130" cy="1754496"/>
+          </a:xfrm>
+          <a:prstGeom prst="straightConnector1">
+            <a:avLst/>
+          </a:prstGeom>
+          <a:ln>
+            <a:tailEnd type="triangle"/>
+          </a:ln>
+        </p:spPr>
+        <p:style>
+          <a:lnRef idx="1">
+            <a:schemeClr val="dk1"/>
+          </a:lnRef>
+          <a:fillRef idx="0">
+            <a:schemeClr val="dk1"/>
+          </a:fillRef>
+          <a:effectRef idx="0">
+            <a:schemeClr val="dk1"/>
+          </a:effectRef>
+          <a:fontRef idx="minor">
+            <a:schemeClr val="tx1"/>
+          </a:fontRef>
+        </p:style>
+      </p:cxnSp>
+      <p:cxnSp>
+        <p:nvCxnSpPr>
+          <p:cNvPr id="16" name="Straight Arrow Connector 15">
+            <a:extLst>
+              <a:ext uri="{FF2B5EF4-FFF2-40B4-BE49-F238E27FC236}">
+                <a16:creationId xmlns:a16="http://schemas.microsoft.com/office/drawing/2014/main" id="{4E32DB51-EF8E-2150-8D5A-8B0C25AAE91B}"/>
+              </a:ext>
+            </a:extLst>
+          </p:cNvPr>
+          <p:cNvCxnSpPr>
+            <a:cxnSpLocks/>
+            <a:stCxn id="9" idx="3"/>
+            <a:endCxn id="13" idx="0"/>
+          </p:cNvCxnSpPr>
+          <p:nvPr/>
+        </p:nvCxnSpPr>
+        <p:spPr>
+          <a:xfrm>
+            <a:off x="8511481" y="1476376"/>
+            <a:ext cx="1130864" cy="1754497"/>
+          </a:xfrm>
+          <a:prstGeom prst="straightConnector1">
+            <a:avLst/>
+          </a:prstGeom>
+          <a:ln>
+            <a:tailEnd type="triangle"/>
+          </a:ln>
+        </p:spPr>
+        <p:style>
+          <a:lnRef idx="1">
+            <a:schemeClr val="dk1"/>
+          </a:lnRef>
+          <a:fillRef idx="0">
+            <a:schemeClr val="dk1"/>
+          </a:fillRef>
+          <a:effectRef idx="0">
+            <a:schemeClr val="dk1"/>
+          </a:effectRef>
+          <a:fontRef idx="minor">
+            <a:schemeClr val="tx1"/>
+          </a:fontRef>
+        </p:style>
+      </p:cxnSp>
     </p:spTree>
     <p:extLst>
       <p:ext uri="{BB962C8B-B14F-4D97-AF65-F5344CB8AC3E}">
-        <p14:creationId xmlns:p14="http://schemas.microsoft.com/office/powerpoint/2010/main" val="3989693785"/>
+        <p14:creationId xmlns:p14="http://schemas.microsoft.com/office/powerpoint/2010/main" val="2057029144"/>
       </p:ext>
     </p:extLst>
   </p:cSld>

</xml_diff>